<commit_message>
Update Presentation + EDA
- Include 3/5 hypothesis for the presentation file in Week 3 and add images folder for the presentation
- Edit errors in the EDA
</commit_message>
<xml_diff>
--- a/Week3/G2M_presentation.pptx
+++ b/Week3/G2M_presentation.pptx
@@ -10,7 +10,14 @@
     <p:sldId id="269" r:id="rId4"/>
     <p:sldId id="270" r:id="rId5"/>
     <p:sldId id="272" r:id="rId6"/>
-    <p:sldId id="268" r:id="rId7"/>
+    <p:sldId id="273" r:id="rId7"/>
+    <p:sldId id="275" r:id="rId8"/>
+    <p:sldId id="277" r:id="rId9"/>
+    <p:sldId id="278" r:id="rId10"/>
+    <p:sldId id="281" r:id="rId11"/>
+    <p:sldId id="282" r:id="rId12"/>
+    <p:sldId id="279" r:id="rId13"/>
+    <p:sldId id="268" r:id="rId14"/>
   </p:sldIdLst>
   <p:sldSz cx="12192000" cy="6858000"/>
   <p:notesSz cx="6858000" cy="9144000"/>
@@ -115,14 +122,6 @@
     </p:ext>
   </p:extLst>
 </p:presentation>
-</file>
-
-<file path=ppt/revisionInfo.xml><?xml version="1.0" encoding="utf-8"?>
-<p1510:revInfo xmlns:a="http://schemas.openxmlformats.org/drawingml/2006/main" xmlns:r="http://schemas.openxmlformats.org/officeDocument/2006/relationships" xmlns:p1510="http://schemas.microsoft.com/office/powerpoint/2015/10/main">
-  <p1510:revLst>
-    <p1510:client id="{36E0061F-BFDE-7175-2EDA-F472504290F4}" v="789" dt="2020-12-24T05:43:13.363"/>
-  </p1510:revLst>
-</p1510:revInfo>
 </file>
 
 <file path=ppt/slideLayouts/slideLayout1.xml><?xml version="1.0" encoding="utf-8"?>
@@ -3085,6 +3084,779 @@
 </p:sld>
 </file>
 
+<file path=ppt/slides/slide10.xml><?xml version="1.0" encoding="utf-8"?>
+<p:sld xmlns:a="http://schemas.openxmlformats.org/drawingml/2006/main" xmlns:r="http://schemas.openxmlformats.org/officeDocument/2006/relationships" xmlns:p="http://schemas.openxmlformats.org/presentationml/2006/main">
+  <p:cSld>
+    <p:spTree>
+      <p:nvGrpSpPr>
+        <p:cNvPr id="1" name=""/>
+        <p:cNvGrpSpPr/>
+        <p:nvPr/>
+      </p:nvGrpSpPr>
+      <p:grpSpPr>
+        <a:xfrm>
+          <a:off x="0" y="0"/>
+          <a:ext cx="0" cy="0"/>
+          <a:chOff x="0" y="0"/>
+          <a:chExt cx="0" cy="0"/>
+        </a:xfrm>
+      </p:grpSpPr>
+      <p:sp>
+        <p:nvSpPr>
+          <p:cNvPr id="3" name="Content Placeholder 2">
+            <a:extLst>
+              <a:ext uri="{FF2B5EF4-FFF2-40B4-BE49-F238E27FC236}">
+                <a16:creationId xmlns:a16="http://schemas.microsoft.com/office/drawing/2014/main" id="{592E5A36-53E0-006E-5354-5FF7DD397199}"/>
+              </a:ext>
+            </a:extLst>
+          </p:cNvPr>
+          <p:cNvSpPr>
+            <a:spLocks noGrp="1"/>
+          </p:cNvSpPr>
+          <p:nvPr>
+            <p:ph idx="1"/>
+          </p:nvPr>
+        </p:nvSpPr>
+        <p:spPr>
+          <a:xfrm>
+            <a:off x="497958" y="1900275"/>
+            <a:ext cx="10515600" cy="4351338"/>
+          </a:xfrm>
+        </p:spPr>
+        <p:txBody>
+          <a:bodyPr/>
+          <a:lstStyle/>
+          <a:p>
+            <a:pPr marL="0" indent="0">
+              <a:buNone/>
+            </a:pPr>
+            <a:endParaRPr lang="en-US" dirty="0"/>
+          </a:p>
+          <a:p>
+            <a:pPr marL="514350" indent="-514350">
+              <a:buAutoNum type="arabicPeriod"/>
+            </a:pPr>
+            <a:endParaRPr lang="en-US" dirty="0"/>
+          </a:p>
+          <a:p>
+            <a:pPr marL="514350" indent="-514350">
+              <a:buAutoNum type="arabicPeriod"/>
+            </a:pPr>
+            <a:endParaRPr lang="en-US" dirty="0"/>
+          </a:p>
+        </p:txBody>
+      </p:sp>
+      <p:sp>
+        <p:nvSpPr>
+          <p:cNvPr id="4" name="Title 1">
+            <a:extLst>
+              <a:ext uri="{FF2B5EF4-FFF2-40B4-BE49-F238E27FC236}">
+                <a16:creationId xmlns:a16="http://schemas.microsoft.com/office/drawing/2014/main" id="{4947E6FE-C552-B034-2EB1-41F75C4E059D}"/>
+              </a:ext>
+            </a:extLst>
+          </p:cNvPr>
+          <p:cNvSpPr txBox="1">
+            <a:spLocks/>
+          </p:cNvSpPr>
+          <p:nvPr/>
+        </p:nvSpPr>
+        <p:spPr>
+          <a:xfrm rot="5400000">
+            <a:off x="5318124" y="-5318125"/>
+            <a:ext cx="1555751" cy="12192002"/>
+          </a:xfrm>
+          <a:prstGeom prst="rect">
+            <a:avLst/>
+          </a:prstGeom>
+          <a:solidFill>
+            <a:srgbClr val="3B3B3B"/>
+          </a:solidFill>
+        </p:spPr>
+        <p:txBody>
+          <a:bodyPr vert="vert270" lIns="91440" tIns="45720" rIns="91440" bIns="45720" rtlCol="0" anchor="t" anchorCtr="0">
+            <a:normAutofit fontScale="70000" lnSpcReduction="20000"/>
+          </a:bodyPr>
+          <a:lstStyle>
+            <a:lvl1pPr algn="l" defTabSz="914400" rtl="0" eaLnBrk="1" latinLnBrk="0" hangingPunct="1">
+              <a:lnSpc>
+                <a:spcPct val="90000"/>
+              </a:lnSpc>
+              <a:spcBef>
+                <a:spcPct val="0"/>
+              </a:spcBef>
+              <a:buNone/>
+              <a:defRPr sz="4400" kern="1200">
+                <a:solidFill>
+                  <a:schemeClr val="tx1"/>
+                </a:solidFill>
+                <a:latin typeface="+mj-lt"/>
+                <a:ea typeface="+mj-ea"/>
+                <a:cs typeface="+mj-cs"/>
+              </a:defRPr>
+            </a:lvl1pPr>
+          </a:lstStyle>
+          <a:p>
+            <a:br>
+              <a:rPr lang="en-US" dirty="0"/>
+            </a:br>
+            <a:br>
+              <a:rPr lang="en-US" dirty="0"/>
+            </a:br>
+            <a:br>
+              <a:rPr lang="en-US" dirty="0"/>
+            </a:br>
+            <a:endParaRPr lang="en-US" b="1" dirty="0">
+              <a:solidFill>
+                <a:srgbClr val="FF6600"/>
+              </a:solidFill>
+            </a:endParaRPr>
+          </a:p>
+        </p:txBody>
+      </p:sp>
+      <p:sp>
+        <p:nvSpPr>
+          <p:cNvPr id="2" name="Title 1">
+            <a:extLst>
+              <a:ext uri="{FF2B5EF4-FFF2-40B4-BE49-F238E27FC236}">
+                <a16:creationId xmlns:a16="http://schemas.microsoft.com/office/drawing/2014/main" id="{174A5255-0698-8C74-EF53-06FF11F1CFC4}"/>
+              </a:ext>
+            </a:extLst>
+          </p:cNvPr>
+          <p:cNvSpPr>
+            <a:spLocks noGrp="1"/>
+          </p:cNvSpPr>
+          <p:nvPr>
+            <p:ph type="title"/>
+          </p:nvPr>
+        </p:nvSpPr>
+        <p:spPr>
+          <a:xfrm>
+            <a:off x="242776" y="152808"/>
+            <a:ext cx="11587273" cy="1325563"/>
+          </a:xfrm>
+        </p:spPr>
+        <p:txBody>
+          <a:bodyPr/>
+          <a:lstStyle/>
+          <a:p>
+            <a:r>
+              <a:rPr lang="en-US" b="1" dirty="0">
+                <a:solidFill>
+                  <a:schemeClr val="bg1"/>
+                </a:solidFill>
+              </a:rPr>
+              <a:t>Hypothesis 3</a:t>
+            </a:r>
+            <a:r>
+              <a:rPr lang="en-US" b="1" dirty="0">
+                <a:solidFill>
+                  <a:srgbClr val="FF6600"/>
+                </a:solidFill>
+              </a:rPr>
+              <a:t>: Pattern in spatial profit of Pink Cab</a:t>
+            </a:r>
+          </a:p>
+        </p:txBody>
+      </p:sp>
+      <p:pic>
+        <p:nvPicPr>
+          <p:cNvPr id="8" name="Picture 7">
+            <a:extLst>
+              <a:ext uri="{FF2B5EF4-FFF2-40B4-BE49-F238E27FC236}">
+                <a16:creationId xmlns:a16="http://schemas.microsoft.com/office/drawing/2014/main" id="{85698DF3-380B-D5FD-DA6D-B107C048B487}"/>
+              </a:ext>
+            </a:extLst>
+          </p:cNvPr>
+          <p:cNvPicPr>
+            <a:picLocks noChangeAspect="1"/>
+          </p:cNvPicPr>
+          <p:nvPr/>
+        </p:nvPicPr>
+        <p:blipFill>
+          <a:blip r:embed="rId2">
+            <a:extLst>
+              <a:ext uri="{28A0092B-C50C-407E-A947-70E740481C1C}">
+                <a14:useLocalDpi xmlns:a14="http://schemas.microsoft.com/office/drawing/2010/main" val="0"/>
+              </a:ext>
+            </a:extLst>
+          </a:blip>
+          <a:stretch>
+            <a:fillRect/>
+          </a:stretch>
+        </p:blipFill>
+        <p:spPr>
+          <a:xfrm>
+            <a:off x="838200" y="1478371"/>
+            <a:ext cx="10515600" cy="4487215"/>
+          </a:xfrm>
+          <a:prstGeom prst="rect">
+            <a:avLst/>
+          </a:prstGeom>
+        </p:spPr>
+      </p:pic>
+      <p:sp>
+        <p:nvSpPr>
+          <p:cNvPr id="9" name="TextBox 8">
+            <a:extLst>
+              <a:ext uri="{FF2B5EF4-FFF2-40B4-BE49-F238E27FC236}">
+                <a16:creationId xmlns:a16="http://schemas.microsoft.com/office/drawing/2014/main" id="{0987FE15-7421-4233-5D85-541F36E47FEA}"/>
+              </a:ext>
+            </a:extLst>
+          </p:cNvPr>
+          <p:cNvSpPr txBox="1"/>
+          <p:nvPr/>
+        </p:nvSpPr>
+        <p:spPr>
+          <a:xfrm>
+            <a:off x="497958" y="5949805"/>
+            <a:ext cx="11446393" cy="923330"/>
+          </a:xfrm>
+          <a:prstGeom prst="rect">
+            <a:avLst/>
+          </a:prstGeom>
+          <a:noFill/>
+        </p:spPr>
+        <p:txBody>
+          <a:bodyPr wrap="square" rtlCol="0">
+            <a:spAutoFit/>
+          </a:bodyPr>
+          <a:lstStyle/>
+          <a:p>
+            <a:pPr marL="285750" indent="-285750">
+              <a:buFontTx/>
+              <a:buChar char="-"/>
+            </a:pPr>
+            <a:r>
+              <a:rPr lang="en-US" dirty="0"/>
+              <a:t>As discussed above, they have most profits in New York (NY), following in Los Angles (LA) where they also have the most customers. </a:t>
+            </a:r>
+          </a:p>
+          <a:p>
+            <a:pPr marL="285750" indent="-285750">
+              <a:buFontTx/>
+              <a:buChar char="-"/>
+            </a:pPr>
+            <a:r>
+              <a:rPr lang="en-US" dirty="0"/>
+              <a:t>They have least profits in Pittsburgh (PA), where they have the least customers. </a:t>
+            </a:r>
+          </a:p>
+        </p:txBody>
+      </p:sp>
+    </p:spTree>
+    <p:extLst>
+      <p:ext uri="{BB962C8B-B14F-4D97-AF65-F5344CB8AC3E}">
+        <p14:creationId xmlns:p14="http://schemas.microsoft.com/office/powerpoint/2010/main" val="2093319518"/>
+      </p:ext>
+    </p:extLst>
+  </p:cSld>
+  <p:clrMapOvr>
+    <a:masterClrMapping/>
+  </p:clrMapOvr>
+</p:sld>
+</file>
+
+<file path=ppt/slides/slide11.xml><?xml version="1.0" encoding="utf-8"?>
+<p:sld xmlns:a="http://schemas.openxmlformats.org/drawingml/2006/main" xmlns:r="http://schemas.openxmlformats.org/officeDocument/2006/relationships" xmlns:p="http://schemas.openxmlformats.org/presentationml/2006/main">
+  <p:cSld>
+    <p:spTree>
+      <p:nvGrpSpPr>
+        <p:cNvPr id="1" name=""/>
+        <p:cNvGrpSpPr/>
+        <p:nvPr/>
+      </p:nvGrpSpPr>
+      <p:grpSpPr>
+        <a:xfrm>
+          <a:off x="0" y="0"/>
+          <a:ext cx="0" cy="0"/>
+          <a:chOff x="0" y="0"/>
+          <a:chExt cx="0" cy="0"/>
+        </a:xfrm>
+      </p:grpSpPr>
+      <p:sp>
+        <p:nvSpPr>
+          <p:cNvPr id="3" name="Content Placeholder 2">
+            <a:extLst>
+              <a:ext uri="{FF2B5EF4-FFF2-40B4-BE49-F238E27FC236}">
+                <a16:creationId xmlns:a16="http://schemas.microsoft.com/office/drawing/2014/main" id="{592E5A36-53E0-006E-5354-5FF7DD397199}"/>
+              </a:ext>
+            </a:extLst>
+          </p:cNvPr>
+          <p:cNvSpPr>
+            <a:spLocks noGrp="1"/>
+          </p:cNvSpPr>
+          <p:nvPr>
+            <p:ph idx="1"/>
+          </p:nvPr>
+        </p:nvSpPr>
+        <p:spPr>
+          <a:xfrm>
+            <a:off x="497958" y="1900275"/>
+            <a:ext cx="10515600" cy="4351338"/>
+          </a:xfrm>
+        </p:spPr>
+        <p:txBody>
+          <a:bodyPr/>
+          <a:lstStyle/>
+          <a:p>
+            <a:pPr marL="0" indent="0">
+              <a:buNone/>
+            </a:pPr>
+            <a:endParaRPr lang="en-US" dirty="0"/>
+          </a:p>
+          <a:p>
+            <a:pPr marL="514350" indent="-514350">
+              <a:buAutoNum type="arabicPeriod"/>
+            </a:pPr>
+            <a:endParaRPr lang="en-US" dirty="0"/>
+          </a:p>
+          <a:p>
+            <a:pPr marL="514350" indent="-514350">
+              <a:buAutoNum type="arabicPeriod"/>
+            </a:pPr>
+            <a:endParaRPr lang="en-US" dirty="0"/>
+          </a:p>
+        </p:txBody>
+      </p:sp>
+      <p:sp>
+        <p:nvSpPr>
+          <p:cNvPr id="4" name="Title 1">
+            <a:extLst>
+              <a:ext uri="{FF2B5EF4-FFF2-40B4-BE49-F238E27FC236}">
+                <a16:creationId xmlns:a16="http://schemas.microsoft.com/office/drawing/2014/main" id="{4947E6FE-C552-B034-2EB1-41F75C4E059D}"/>
+              </a:ext>
+            </a:extLst>
+          </p:cNvPr>
+          <p:cNvSpPr txBox="1">
+            <a:spLocks/>
+          </p:cNvSpPr>
+          <p:nvPr/>
+        </p:nvSpPr>
+        <p:spPr>
+          <a:xfrm rot="5400000">
+            <a:off x="5318124" y="-5318125"/>
+            <a:ext cx="1555751" cy="12192002"/>
+          </a:xfrm>
+          <a:prstGeom prst="rect">
+            <a:avLst/>
+          </a:prstGeom>
+          <a:solidFill>
+            <a:srgbClr val="3B3B3B"/>
+          </a:solidFill>
+        </p:spPr>
+        <p:txBody>
+          <a:bodyPr vert="vert270" lIns="91440" tIns="45720" rIns="91440" bIns="45720" rtlCol="0" anchor="t" anchorCtr="0">
+            <a:normAutofit fontScale="70000" lnSpcReduction="20000"/>
+          </a:bodyPr>
+          <a:lstStyle>
+            <a:lvl1pPr algn="l" defTabSz="914400" rtl="0" eaLnBrk="1" latinLnBrk="0" hangingPunct="1">
+              <a:lnSpc>
+                <a:spcPct val="90000"/>
+              </a:lnSpc>
+              <a:spcBef>
+                <a:spcPct val="0"/>
+              </a:spcBef>
+              <a:buNone/>
+              <a:defRPr sz="4400" kern="1200">
+                <a:solidFill>
+                  <a:schemeClr val="tx1"/>
+                </a:solidFill>
+                <a:latin typeface="+mj-lt"/>
+                <a:ea typeface="+mj-ea"/>
+                <a:cs typeface="+mj-cs"/>
+              </a:defRPr>
+            </a:lvl1pPr>
+          </a:lstStyle>
+          <a:p>
+            <a:br>
+              <a:rPr lang="en-US" dirty="0"/>
+            </a:br>
+            <a:br>
+              <a:rPr lang="en-US" dirty="0"/>
+            </a:br>
+            <a:br>
+              <a:rPr lang="en-US" dirty="0"/>
+            </a:br>
+            <a:endParaRPr lang="en-US" b="1" dirty="0">
+              <a:solidFill>
+                <a:srgbClr val="FF6600"/>
+              </a:solidFill>
+            </a:endParaRPr>
+          </a:p>
+        </p:txBody>
+      </p:sp>
+      <p:sp>
+        <p:nvSpPr>
+          <p:cNvPr id="2" name="Title 1">
+            <a:extLst>
+              <a:ext uri="{FF2B5EF4-FFF2-40B4-BE49-F238E27FC236}">
+                <a16:creationId xmlns:a16="http://schemas.microsoft.com/office/drawing/2014/main" id="{174A5255-0698-8C74-EF53-06FF11F1CFC4}"/>
+              </a:ext>
+            </a:extLst>
+          </p:cNvPr>
+          <p:cNvSpPr>
+            <a:spLocks noGrp="1"/>
+          </p:cNvSpPr>
+          <p:nvPr>
+            <p:ph type="title"/>
+          </p:nvPr>
+        </p:nvSpPr>
+        <p:spPr>
+          <a:xfrm>
+            <a:off x="242776" y="152808"/>
+            <a:ext cx="11701575" cy="1325563"/>
+          </a:xfrm>
+        </p:spPr>
+        <p:txBody>
+          <a:bodyPr/>
+          <a:lstStyle/>
+          <a:p>
+            <a:r>
+              <a:rPr lang="en-US" b="1" dirty="0">
+                <a:solidFill>
+                  <a:schemeClr val="bg1"/>
+                </a:solidFill>
+              </a:rPr>
+              <a:t>Hypothesis 3</a:t>
+            </a:r>
+            <a:r>
+              <a:rPr lang="en-US" b="1" dirty="0">
+                <a:solidFill>
+                  <a:srgbClr val="FF6600"/>
+                </a:solidFill>
+              </a:rPr>
+              <a:t>: Pattern in spatial profit of Yellow Cab</a:t>
+            </a:r>
+          </a:p>
+        </p:txBody>
+      </p:sp>
+      <p:sp>
+        <p:nvSpPr>
+          <p:cNvPr id="9" name="TextBox 8">
+            <a:extLst>
+              <a:ext uri="{FF2B5EF4-FFF2-40B4-BE49-F238E27FC236}">
+                <a16:creationId xmlns:a16="http://schemas.microsoft.com/office/drawing/2014/main" id="{0987FE15-7421-4233-5D85-541F36E47FEA}"/>
+              </a:ext>
+            </a:extLst>
+          </p:cNvPr>
+          <p:cNvSpPr txBox="1"/>
+          <p:nvPr/>
+        </p:nvSpPr>
+        <p:spPr>
+          <a:xfrm>
+            <a:off x="497958" y="5651448"/>
+            <a:ext cx="11446393" cy="1200329"/>
+          </a:xfrm>
+          <a:prstGeom prst="rect">
+            <a:avLst/>
+          </a:prstGeom>
+          <a:noFill/>
+        </p:spPr>
+        <p:txBody>
+          <a:bodyPr wrap="square" rtlCol="0">
+            <a:spAutoFit/>
+          </a:bodyPr>
+          <a:lstStyle/>
+          <a:p>
+            <a:pPr marL="285750" indent="-285750">
+              <a:buFontTx/>
+              <a:buChar char="-"/>
+            </a:pPr>
+            <a:r>
+              <a:rPr lang="en-US" dirty="0"/>
+              <a:t>As discussed above, they have most profits in New York (NY), following in Los Angles (LA) where they also have the most customers. </a:t>
+            </a:r>
+          </a:p>
+          <a:p>
+            <a:pPr marL="285750" indent="-285750">
+              <a:buFontTx/>
+              <a:buChar char="-"/>
+            </a:pPr>
+            <a:r>
+              <a:rPr lang="en-US" dirty="0"/>
+              <a:t>They have least profits in Pittsburgh (PA), where they have the least customers. Other than that, they seemed not to have much profit in Sacramento (CA) and Tucson (AZ) either</a:t>
+            </a:r>
+          </a:p>
+        </p:txBody>
+      </p:sp>
+      <p:pic>
+        <p:nvPicPr>
+          <p:cNvPr id="10" name="Picture 9">
+            <a:extLst>
+              <a:ext uri="{FF2B5EF4-FFF2-40B4-BE49-F238E27FC236}">
+                <a16:creationId xmlns:a16="http://schemas.microsoft.com/office/drawing/2014/main" id="{B8DB32F6-BAB0-B295-5EBD-98CDE807FB1B}"/>
+              </a:ext>
+            </a:extLst>
+          </p:cNvPr>
+          <p:cNvPicPr>
+            <a:picLocks noChangeAspect="1"/>
+          </p:cNvPicPr>
+          <p:nvPr/>
+        </p:nvPicPr>
+        <p:blipFill>
+          <a:blip r:embed="rId2">
+            <a:extLst>
+              <a:ext uri="{28A0092B-C50C-407E-A947-70E740481C1C}">
+                <a14:useLocalDpi xmlns:a14="http://schemas.microsoft.com/office/drawing/2010/main" val="0"/>
+              </a:ext>
+            </a:extLst>
+          </a:blip>
+          <a:stretch>
+            <a:fillRect/>
+          </a:stretch>
+        </p:blipFill>
+        <p:spPr>
+          <a:xfrm>
+            <a:off x="1426645" y="1609985"/>
+            <a:ext cx="9586913" cy="4090926"/>
+          </a:xfrm>
+          <a:prstGeom prst="rect">
+            <a:avLst/>
+          </a:prstGeom>
+        </p:spPr>
+      </p:pic>
+    </p:spTree>
+    <p:extLst>
+      <p:ext uri="{BB962C8B-B14F-4D97-AF65-F5344CB8AC3E}">
+        <p14:creationId xmlns:p14="http://schemas.microsoft.com/office/powerpoint/2010/main" val="1566968541"/>
+      </p:ext>
+    </p:extLst>
+  </p:cSld>
+  <p:clrMapOvr>
+    <a:masterClrMapping/>
+  </p:clrMapOvr>
+</p:sld>
+</file>
+
+<file path=ppt/slides/slide12.xml><?xml version="1.0" encoding="utf-8"?>
+<p:sld xmlns:a="http://schemas.openxmlformats.org/drawingml/2006/main" xmlns:r="http://schemas.openxmlformats.org/officeDocument/2006/relationships" xmlns:p="http://schemas.openxmlformats.org/presentationml/2006/main">
+  <p:cSld>
+    <p:spTree>
+      <p:nvGrpSpPr>
+        <p:cNvPr id="1" name=""/>
+        <p:cNvGrpSpPr/>
+        <p:nvPr/>
+      </p:nvGrpSpPr>
+      <p:grpSpPr>
+        <a:xfrm>
+          <a:off x="0" y="0"/>
+          <a:ext cx="0" cy="0"/>
+          <a:chOff x="0" y="0"/>
+          <a:chExt cx="0" cy="0"/>
+        </a:xfrm>
+      </p:grpSpPr>
+      <p:sp>
+        <p:nvSpPr>
+          <p:cNvPr id="2" name="Title 1">
+            <a:extLst>
+              <a:ext uri="{FF2B5EF4-FFF2-40B4-BE49-F238E27FC236}">
+                <a16:creationId xmlns:a16="http://schemas.microsoft.com/office/drawing/2014/main" id="{21E6CB7E-DEE4-2510-FC4E-9BDE3FED2D60}"/>
+              </a:ext>
+            </a:extLst>
+          </p:cNvPr>
+          <p:cNvSpPr>
+            <a:spLocks noGrp="1"/>
+          </p:cNvSpPr>
+          <p:nvPr>
+            <p:ph type="title"/>
+          </p:nvPr>
+        </p:nvSpPr>
+        <p:spPr/>
+        <p:txBody>
+          <a:bodyPr/>
+          <a:lstStyle/>
+          <a:p>
+            <a:endParaRPr lang="en-US"/>
+          </a:p>
+        </p:txBody>
+      </p:sp>
+      <p:sp>
+        <p:nvSpPr>
+          <p:cNvPr id="3" name="Content Placeholder 2">
+            <a:extLst>
+              <a:ext uri="{FF2B5EF4-FFF2-40B4-BE49-F238E27FC236}">
+                <a16:creationId xmlns:a16="http://schemas.microsoft.com/office/drawing/2014/main" id="{A5C05616-45BC-9F75-2C57-C2016E78CF71}"/>
+              </a:ext>
+            </a:extLst>
+          </p:cNvPr>
+          <p:cNvSpPr>
+            <a:spLocks noGrp="1"/>
+          </p:cNvSpPr>
+          <p:nvPr>
+            <p:ph idx="1"/>
+          </p:nvPr>
+        </p:nvSpPr>
+        <p:spPr/>
+        <p:txBody>
+          <a:bodyPr/>
+          <a:lstStyle/>
+          <a:p>
+            <a:endParaRPr lang="en-US"/>
+          </a:p>
+        </p:txBody>
+      </p:sp>
+    </p:spTree>
+    <p:extLst>
+      <p:ext uri="{BB962C8B-B14F-4D97-AF65-F5344CB8AC3E}">
+        <p14:creationId xmlns:p14="http://schemas.microsoft.com/office/powerpoint/2010/main" val="1794949034"/>
+      </p:ext>
+    </p:extLst>
+  </p:cSld>
+  <p:clrMapOvr>
+    <a:masterClrMapping/>
+  </p:clrMapOvr>
+</p:sld>
+</file>
+
+<file path=ppt/slides/slide13.xml><?xml version="1.0" encoding="utf-8"?>
+<p:sld xmlns:a="http://schemas.openxmlformats.org/drawingml/2006/main" xmlns:r="http://schemas.openxmlformats.org/officeDocument/2006/relationships" xmlns:p="http://schemas.openxmlformats.org/presentationml/2006/main">
+  <p:cSld>
+    <p:spTree>
+      <p:nvGrpSpPr>
+        <p:cNvPr id="1" name=""/>
+        <p:cNvGrpSpPr/>
+        <p:nvPr/>
+      </p:nvGrpSpPr>
+      <p:grpSpPr>
+        <a:xfrm>
+          <a:off x="0" y="0"/>
+          <a:ext cx="0" cy="0"/>
+          <a:chOff x="0" y="0"/>
+          <a:chExt cx="0" cy="0"/>
+        </a:xfrm>
+      </p:grpSpPr>
+      <p:sp>
+        <p:nvSpPr>
+          <p:cNvPr id="2" name="Title 1">
+            <a:extLst>
+              <a:ext uri="{FF2B5EF4-FFF2-40B4-BE49-F238E27FC236}">
+                <a16:creationId xmlns:a16="http://schemas.microsoft.com/office/drawing/2014/main" id="{E8B8F26E-9345-4747-9094-972E38700A17}"/>
+              </a:ext>
+            </a:extLst>
+          </p:cNvPr>
+          <p:cNvSpPr>
+            <a:spLocks noGrp="1"/>
+          </p:cNvSpPr>
+          <p:nvPr>
+            <p:ph type="ctrTitle"/>
+          </p:nvPr>
+        </p:nvSpPr>
+        <p:spPr>
+          <a:xfrm rot="5400000">
+            <a:off x="-562431" y="562430"/>
+            <a:ext cx="6858002" cy="5733142"/>
+          </a:xfrm>
+          <a:solidFill>
+            <a:srgbClr val="3B3B3B"/>
+          </a:solidFill>
+        </p:spPr>
+        <p:txBody>
+          <a:bodyPr vert="vert270" anchor="t" anchorCtr="0"/>
+          <a:lstStyle/>
+          <a:p>
+            <a:endParaRPr lang="en-US" b="1" dirty="0">
+              <a:solidFill>
+                <a:srgbClr val="FF6600"/>
+              </a:solidFill>
+            </a:endParaRPr>
+          </a:p>
+        </p:txBody>
+      </p:sp>
+      <p:pic>
+        <p:nvPicPr>
+          <p:cNvPr id="4" name="Picture 3">
+            <a:extLst>
+              <a:ext uri="{FF2B5EF4-FFF2-40B4-BE49-F238E27FC236}">
+                <a16:creationId xmlns:a16="http://schemas.microsoft.com/office/drawing/2014/main" id="{7A465064-0714-5743-882B-8875105A7023}"/>
+              </a:ext>
+            </a:extLst>
+          </p:cNvPr>
+          <p:cNvPicPr>
+            <a:picLocks noChangeAspect="1"/>
+          </p:cNvPicPr>
+          <p:nvPr/>
+        </p:nvPicPr>
+        <p:blipFill>
+          <a:blip r:embed="rId2">
+            <a:extLst>
+              <a:ext uri="{28A0092B-C50C-407E-A947-70E740481C1C}">
+                <a14:useLocalDpi xmlns:a14="http://schemas.microsoft.com/office/drawing/2010/main" val="0"/>
+              </a:ext>
+            </a:extLst>
+          </a:blip>
+          <a:stretch>
+            <a:fillRect/>
+          </a:stretch>
+        </p:blipFill>
+        <p:spPr>
+          <a:xfrm>
+            <a:off x="0" y="5863771"/>
+            <a:ext cx="1654627" cy="994232"/>
+          </a:xfrm>
+          <a:prstGeom prst="rect">
+            <a:avLst/>
+          </a:prstGeom>
+        </p:spPr>
+      </p:pic>
+      <p:sp>
+        <p:nvSpPr>
+          <p:cNvPr id="6" name="Subtitle 5">
+            <a:extLst>
+              <a:ext uri="{FF2B5EF4-FFF2-40B4-BE49-F238E27FC236}">
+                <a16:creationId xmlns:a16="http://schemas.microsoft.com/office/drawing/2014/main" id="{2D4BA697-580E-5544-8F2F-194AD99B859F}"/>
+              </a:ext>
+            </a:extLst>
+          </p:cNvPr>
+          <p:cNvSpPr>
+            <a:spLocks noGrp="1"/>
+          </p:cNvSpPr>
+          <p:nvPr>
+            <p:ph type="subTitle" idx="1"/>
+          </p:nvPr>
+        </p:nvSpPr>
+        <p:spPr>
+          <a:xfrm>
+            <a:off x="5152570" y="2481943"/>
+            <a:ext cx="5558973" cy="1655762"/>
+          </a:xfrm>
+        </p:spPr>
+        <p:txBody>
+          <a:bodyPr>
+            <a:normAutofit/>
+          </a:bodyPr>
+          <a:lstStyle/>
+          <a:p>
+            <a:r>
+              <a:rPr lang="en-US" sz="6600" dirty="0">
+                <a:solidFill>
+                  <a:srgbClr val="FF6600"/>
+                </a:solidFill>
+              </a:rPr>
+              <a:t>Thank You</a:t>
+            </a:r>
+          </a:p>
+          <a:p>
+            <a:endParaRPr lang="en-US" sz="6600" dirty="0">
+              <a:solidFill>
+                <a:srgbClr val="FF6600"/>
+              </a:solidFill>
+            </a:endParaRPr>
+          </a:p>
+        </p:txBody>
+      </p:sp>
+    </p:spTree>
+    <p:extLst>
+      <p:ext uri="{BB962C8B-B14F-4D97-AF65-F5344CB8AC3E}">
+        <p14:creationId xmlns:p14="http://schemas.microsoft.com/office/powerpoint/2010/main" val="116821060"/>
+      </p:ext>
+    </p:extLst>
+  </p:cSld>
+  <p:clrMapOvr>
+    <a:masterClrMapping/>
+  </p:clrMapOvr>
+</p:sld>
+</file>
+
 <file path=ppt/slides/slide2.xml><?xml version="1.0" encoding="utf-8"?>
 <p:sld xmlns:a="http://schemas.openxmlformats.org/drawingml/2006/main" xmlns:r="http://schemas.openxmlformats.org/officeDocument/2006/relationships" xmlns:p="http://schemas.openxmlformats.org/presentationml/2006/main">
   <p:cSld>
@@ -3903,7 +4675,7 @@
             </a:pPr>
             <a:r>
               <a:rPr lang="en-US" dirty="0"/>
-              <a:t>Is there any different in amount of customers and profits in different cities?</a:t>
+              <a:t>Is there any different in amount of customers and profit in different cities?</a:t>
             </a:r>
           </a:p>
           <a:p>
@@ -3912,7 +4684,24 @@
             </a:pPr>
             <a:r>
               <a:rPr lang="en-US" dirty="0"/>
-              <a:t>Is there any factors affect the profit making for 2 companies, such as gender, payment mode, and income level?</a:t>
+              <a:t>Is there any pattern for the spatial profits from 2 different companies?</a:t>
+            </a:r>
+          </a:p>
+          <a:p>
+            <a:pPr marL="514350" indent="-514350">
+              <a:buAutoNum type="arabicPeriod"/>
+            </a:pPr>
+            <a:r>
+              <a:rPr lang="en-US" dirty="0"/>
+              <a:t>Is there any factors affect the profit making for 2 companies, such as gender, payment mode, </a:t>
+            </a:r>
+            <a:r>
+              <a:rPr lang="en-US" dirty="0" err="1"/>
+              <a:t>age,and</a:t>
+            </a:r>
+            <a:r>
+              <a:rPr lang="en-US" dirty="0"/>
+              <a:t> income level?</a:t>
             </a:r>
           </a:p>
           <a:p>
@@ -4071,10 +4860,10 @@
       </p:grpSpPr>
       <p:sp>
         <p:nvSpPr>
-          <p:cNvPr id="2" name="Title 1">
+          <p:cNvPr id="3" name="Content Placeholder 2">
             <a:extLst>
               <a:ext uri="{FF2B5EF4-FFF2-40B4-BE49-F238E27FC236}">
-                <a16:creationId xmlns:a16="http://schemas.microsoft.com/office/drawing/2014/main" id="{E8B8F26E-9345-4747-9094-972E38700A17}"/>
+                <a16:creationId xmlns:a16="http://schemas.microsoft.com/office/drawing/2014/main" id="{592E5A36-53E0-006E-5354-5FF7DD397199}"/>
               </a:ext>
             </a:extLst>
           </p:cNvPr>
@@ -4082,22 +4871,97 @@
             <a:spLocks noGrp="1"/>
           </p:cNvSpPr>
           <p:nvPr>
-            <p:ph type="ctrTitle"/>
-          </p:nvPr>
+            <p:ph idx="1"/>
+          </p:nvPr>
+        </p:nvSpPr>
+        <p:spPr>
+          <a:xfrm>
+            <a:off x="497958" y="1900275"/>
+            <a:ext cx="10515600" cy="4351338"/>
+          </a:xfrm>
+        </p:spPr>
+        <p:txBody>
+          <a:bodyPr/>
+          <a:lstStyle/>
+          <a:p>
+            <a:pPr marL="0" indent="0">
+              <a:buNone/>
+            </a:pPr>
+            <a:endParaRPr lang="en-US" dirty="0"/>
+          </a:p>
+          <a:p>
+            <a:pPr marL="514350" indent="-514350">
+              <a:buAutoNum type="arabicPeriod"/>
+            </a:pPr>
+            <a:endParaRPr lang="en-US" dirty="0"/>
+          </a:p>
+          <a:p>
+            <a:pPr marL="514350" indent="-514350">
+              <a:buAutoNum type="arabicPeriod"/>
+            </a:pPr>
+            <a:endParaRPr lang="en-US" dirty="0"/>
+          </a:p>
+        </p:txBody>
+      </p:sp>
+      <p:sp>
+        <p:nvSpPr>
+          <p:cNvPr id="4" name="Title 1">
+            <a:extLst>
+              <a:ext uri="{FF2B5EF4-FFF2-40B4-BE49-F238E27FC236}">
+                <a16:creationId xmlns:a16="http://schemas.microsoft.com/office/drawing/2014/main" id="{4947E6FE-C552-B034-2EB1-41F75C4E059D}"/>
+              </a:ext>
+            </a:extLst>
+          </p:cNvPr>
+          <p:cNvSpPr txBox="1">
+            <a:spLocks/>
+          </p:cNvSpPr>
+          <p:nvPr/>
         </p:nvSpPr>
         <p:spPr>
           <a:xfrm rot="5400000">
-            <a:off x="-562431" y="562430"/>
-            <a:ext cx="6858002" cy="5733142"/>
-          </a:xfrm>
+            <a:off x="5318124" y="-5318125"/>
+            <a:ext cx="1555751" cy="12192002"/>
+          </a:xfrm>
+          <a:prstGeom prst="rect">
+            <a:avLst/>
+          </a:prstGeom>
           <a:solidFill>
             <a:srgbClr val="3B3B3B"/>
           </a:solidFill>
         </p:spPr>
         <p:txBody>
-          <a:bodyPr vert="vert270" anchor="t" anchorCtr="0"/>
-          <a:lstStyle/>
-          <a:p>
+          <a:bodyPr vert="vert270" lIns="91440" tIns="45720" rIns="91440" bIns="45720" rtlCol="0" anchor="t" anchorCtr="0">
+            <a:normAutofit fontScale="70000" lnSpcReduction="20000"/>
+          </a:bodyPr>
+          <a:lstStyle>
+            <a:lvl1pPr algn="l" defTabSz="914400" rtl="0" eaLnBrk="1" latinLnBrk="0" hangingPunct="1">
+              <a:lnSpc>
+                <a:spcPct val="90000"/>
+              </a:lnSpc>
+              <a:spcBef>
+                <a:spcPct val="0"/>
+              </a:spcBef>
+              <a:buNone/>
+              <a:defRPr sz="4400" kern="1200">
+                <a:solidFill>
+                  <a:schemeClr val="tx1"/>
+                </a:solidFill>
+                <a:latin typeface="+mj-lt"/>
+                <a:ea typeface="+mj-ea"/>
+                <a:cs typeface="+mj-cs"/>
+              </a:defRPr>
+            </a:lvl1pPr>
+          </a:lstStyle>
+          <a:p>
+            <a:br>
+              <a:rPr lang="en-US" dirty="0"/>
+            </a:br>
+            <a:br>
+              <a:rPr lang="en-US" dirty="0"/>
+            </a:br>
+            <a:br>
+              <a:rPr lang="en-US" dirty="0"/>
+            </a:br>
             <a:endParaRPr lang="en-US" b="1" dirty="0">
               <a:solidFill>
                 <a:srgbClr val="FF6600"/>
@@ -4106,12 +4970,57 @@
           </a:p>
         </p:txBody>
       </p:sp>
+      <p:sp>
+        <p:nvSpPr>
+          <p:cNvPr id="2" name="Title 1">
+            <a:extLst>
+              <a:ext uri="{FF2B5EF4-FFF2-40B4-BE49-F238E27FC236}">
+                <a16:creationId xmlns:a16="http://schemas.microsoft.com/office/drawing/2014/main" id="{174A5255-0698-8C74-EF53-06FF11F1CFC4}"/>
+              </a:ext>
+            </a:extLst>
+          </p:cNvPr>
+          <p:cNvSpPr>
+            <a:spLocks noGrp="1"/>
+          </p:cNvSpPr>
+          <p:nvPr>
+            <p:ph type="title"/>
+          </p:nvPr>
+        </p:nvSpPr>
+        <p:spPr>
+          <a:xfrm>
+            <a:off x="242777" y="152808"/>
+            <a:ext cx="10515600" cy="1325563"/>
+          </a:xfrm>
+        </p:spPr>
+        <p:txBody>
+          <a:bodyPr/>
+          <a:lstStyle/>
+          <a:p>
+            <a:r>
+              <a:rPr lang="en-US" b="1" dirty="0">
+                <a:solidFill>
+                  <a:schemeClr val="bg1"/>
+                </a:solidFill>
+              </a:rPr>
+              <a:t>Hypothesis 1</a:t>
+            </a:r>
+            <a:r>
+              <a:rPr lang="en-US" b="1" dirty="0">
+                <a:solidFill>
+                  <a:srgbClr val="FF6600"/>
+                </a:solidFill>
+              </a:rPr>
+              <a:t>: Different in monthly and annually profit</a:t>
+            </a:r>
+          </a:p>
+        </p:txBody>
+      </p:sp>
       <p:pic>
         <p:nvPicPr>
-          <p:cNvPr id="4" name="Picture 3">
+          <p:cNvPr id="16" name="Picture 15">
             <a:extLst>
               <a:ext uri="{FF2B5EF4-FFF2-40B4-BE49-F238E27FC236}">
-                <a16:creationId xmlns:a16="http://schemas.microsoft.com/office/drawing/2014/main" id="{7A465064-0714-5743-882B-8875105A7023}"/>
+                <a16:creationId xmlns:a16="http://schemas.microsoft.com/office/drawing/2014/main" id="{752235F9-82FD-B69E-D312-4D7833635447}"/>
               </a:ext>
             </a:extLst>
           </p:cNvPr>
@@ -4134,53 +5043,562 @@
         </p:blipFill>
         <p:spPr>
           <a:xfrm>
-            <a:off x="0" y="5863771"/>
-            <a:ext cx="1654627" cy="994232"/>
+            <a:off x="227437" y="1504576"/>
+            <a:ext cx="4114911" cy="2555928"/>
           </a:xfrm>
           <a:prstGeom prst="rect">
             <a:avLst/>
           </a:prstGeom>
         </p:spPr>
       </p:pic>
-      <p:sp>
-        <p:nvSpPr>
-          <p:cNvPr id="6" name="Subtitle 5">
+      <p:pic>
+        <p:nvPicPr>
+          <p:cNvPr id="18" name="Picture 17">
             <a:extLst>
               <a:ext uri="{FF2B5EF4-FFF2-40B4-BE49-F238E27FC236}">
-                <a16:creationId xmlns:a16="http://schemas.microsoft.com/office/drawing/2014/main" id="{2D4BA697-580E-5544-8F2F-194AD99B859F}"/>
+                <a16:creationId xmlns:a16="http://schemas.microsoft.com/office/drawing/2014/main" id="{86513DD7-A292-807D-509A-9DFFB5186E65}"/>
               </a:ext>
             </a:extLst>
           </p:cNvPr>
-          <p:cNvSpPr>
-            <a:spLocks noGrp="1"/>
-          </p:cNvSpPr>
-          <p:nvPr>
-            <p:ph type="subTitle" idx="1"/>
-          </p:nvPr>
-        </p:nvSpPr>
+          <p:cNvPicPr>
+            <a:picLocks noChangeAspect="1"/>
+          </p:cNvPicPr>
+          <p:nvPr/>
+        </p:nvPicPr>
+        <p:blipFill>
+          <a:blip r:embed="rId3">
+            <a:extLst>
+              <a:ext uri="{28A0092B-C50C-407E-A947-70E740481C1C}">
+                <a14:useLocalDpi xmlns:a14="http://schemas.microsoft.com/office/drawing/2010/main" val="0"/>
+              </a:ext>
+            </a:extLst>
+          </a:blip>
+          <a:stretch>
+            <a:fillRect/>
+          </a:stretch>
+        </p:blipFill>
         <p:spPr>
           <a:xfrm>
-            <a:off x="5152570" y="2481943"/>
-            <a:ext cx="5558973" cy="1655762"/>
-          </a:xfrm>
-        </p:spPr>
-        <p:txBody>
-          <a:bodyPr>
-            <a:normAutofit/>
+            <a:off x="230761" y="3988044"/>
+            <a:ext cx="4114911" cy="2555928"/>
+          </a:xfrm>
+          <a:prstGeom prst="rect">
+            <a:avLst/>
+          </a:prstGeom>
+        </p:spPr>
+      </p:pic>
+      <p:pic>
+        <p:nvPicPr>
+          <p:cNvPr id="20" name="Picture 19">
+            <a:extLst>
+              <a:ext uri="{FF2B5EF4-FFF2-40B4-BE49-F238E27FC236}">
+                <a16:creationId xmlns:a16="http://schemas.microsoft.com/office/drawing/2014/main" id="{34C9483B-2B0B-03B9-9ADB-04012917DA1A}"/>
+              </a:ext>
+            </a:extLst>
+          </p:cNvPr>
+          <p:cNvPicPr>
+            <a:picLocks noChangeAspect="1"/>
+          </p:cNvPicPr>
+          <p:nvPr/>
+        </p:nvPicPr>
+        <p:blipFill>
+          <a:blip r:embed="rId4">
+            <a:extLst>
+              <a:ext uri="{28A0092B-C50C-407E-A947-70E740481C1C}">
+                <a14:useLocalDpi xmlns:a14="http://schemas.microsoft.com/office/drawing/2010/main" val="0"/>
+              </a:ext>
+            </a:extLst>
+          </a:blip>
+          <a:stretch>
+            <a:fillRect/>
+          </a:stretch>
+        </p:blipFill>
+        <p:spPr>
+          <a:xfrm>
+            <a:off x="4342348" y="1504362"/>
+            <a:ext cx="4114911" cy="2581110"/>
+          </a:xfrm>
+          <a:prstGeom prst="rect">
+            <a:avLst/>
+          </a:prstGeom>
+        </p:spPr>
+      </p:pic>
+      <p:sp>
+        <p:nvSpPr>
+          <p:cNvPr id="21" name="TextBox 20">
+            <a:extLst>
+              <a:ext uri="{FF2B5EF4-FFF2-40B4-BE49-F238E27FC236}">
+                <a16:creationId xmlns:a16="http://schemas.microsoft.com/office/drawing/2014/main" id="{2CDCCF61-AEAD-BD72-B08F-F591273DD0E4}"/>
+              </a:ext>
+            </a:extLst>
+          </p:cNvPr>
+          <p:cNvSpPr txBox="1"/>
+          <p:nvPr/>
+        </p:nvSpPr>
+        <p:spPr>
+          <a:xfrm>
+            <a:off x="4872121" y="4111463"/>
+            <a:ext cx="6408634" cy="2308324"/>
+          </a:xfrm>
+          <a:prstGeom prst="rect">
+            <a:avLst/>
+          </a:prstGeom>
+          <a:noFill/>
+        </p:spPr>
+        <p:txBody>
+          <a:bodyPr wrap="square" rtlCol="0">
+            <a:spAutoFit/>
           </a:bodyPr>
           <a:lstStyle/>
           <a:p>
-            <a:r>
-              <a:rPr lang="en-US" sz="6600" dirty="0">
+            <a:pPr marL="285750" indent="-285750">
+              <a:buFontTx/>
+              <a:buChar char="-"/>
+            </a:pPr>
+            <a:r>
+              <a:rPr lang="en-US" dirty="0"/>
+              <a:t>These graphs illustrate the monthly profits from 2 companies, Pink Cab and Yellow Cab, between 2016 and 2018. </a:t>
+            </a:r>
+          </a:p>
+          <a:p>
+            <a:pPr marL="285750" indent="-285750">
+              <a:buFontTx/>
+              <a:buChar char="-"/>
+            </a:pPr>
+            <a:r>
+              <a:rPr lang="en-US" dirty="0"/>
+              <a:t>From those graphs, we can see that the Yellow Cab made much more profit than Pink Cab for every month in every year. </a:t>
+            </a:r>
+          </a:p>
+          <a:p>
+            <a:pPr marL="285750" indent="-285750">
+              <a:buFontTx/>
+              <a:buChar char="-"/>
+            </a:pPr>
+            <a:r>
+              <a:rPr lang="en-US" dirty="0"/>
+              <a:t>The Pink Cab tended to make more profit in the last quarter of the year and less profit in the second quarter of the year. </a:t>
+            </a:r>
+          </a:p>
+          <a:p>
+            <a:pPr marL="285750" indent="-285750">
+              <a:buFontTx/>
+              <a:buChar char="-"/>
+            </a:pPr>
+            <a:r>
+              <a:rPr lang="en-US" dirty="0"/>
+              <a:t>The Yellow cab tended to make most profits at the end of the year, and least profit in the third quarter of the year</a:t>
+            </a:r>
+          </a:p>
+        </p:txBody>
+      </p:sp>
+    </p:spTree>
+    <p:extLst>
+      <p:ext uri="{BB962C8B-B14F-4D97-AF65-F5344CB8AC3E}">
+        <p14:creationId xmlns:p14="http://schemas.microsoft.com/office/powerpoint/2010/main" val="2003905407"/>
+      </p:ext>
+    </p:extLst>
+  </p:cSld>
+  <p:clrMapOvr>
+    <a:masterClrMapping/>
+  </p:clrMapOvr>
+</p:sld>
+</file>
+
+<file path=ppt/slides/slide7.xml><?xml version="1.0" encoding="utf-8"?>
+<p:sld xmlns:a="http://schemas.openxmlformats.org/drawingml/2006/main" xmlns:r="http://schemas.openxmlformats.org/officeDocument/2006/relationships" xmlns:p="http://schemas.openxmlformats.org/presentationml/2006/main">
+  <p:cSld>
+    <p:spTree>
+      <p:nvGrpSpPr>
+        <p:cNvPr id="1" name=""/>
+        <p:cNvGrpSpPr/>
+        <p:nvPr/>
+      </p:nvGrpSpPr>
+      <p:grpSpPr>
+        <a:xfrm>
+          <a:off x="0" y="0"/>
+          <a:ext cx="0" cy="0"/>
+          <a:chOff x="0" y="0"/>
+          <a:chExt cx="0" cy="0"/>
+        </a:xfrm>
+      </p:grpSpPr>
+      <p:sp>
+        <p:nvSpPr>
+          <p:cNvPr id="3" name="Content Placeholder 2">
+            <a:extLst>
+              <a:ext uri="{FF2B5EF4-FFF2-40B4-BE49-F238E27FC236}">
+                <a16:creationId xmlns:a16="http://schemas.microsoft.com/office/drawing/2014/main" id="{592E5A36-53E0-006E-5354-5FF7DD397199}"/>
+              </a:ext>
+            </a:extLst>
+          </p:cNvPr>
+          <p:cNvSpPr>
+            <a:spLocks noGrp="1"/>
+          </p:cNvSpPr>
+          <p:nvPr>
+            <p:ph idx="1"/>
+          </p:nvPr>
+        </p:nvSpPr>
+        <p:spPr>
+          <a:xfrm>
+            <a:off x="497958" y="1900275"/>
+            <a:ext cx="10515600" cy="4351338"/>
+          </a:xfrm>
+        </p:spPr>
+        <p:txBody>
+          <a:bodyPr/>
+          <a:lstStyle/>
+          <a:p>
+            <a:pPr marL="0" indent="0">
+              <a:buNone/>
+            </a:pPr>
+            <a:endParaRPr lang="en-US" dirty="0"/>
+          </a:p>
+          <a:p>
+            <a:pPr marL="514350" indent="-514350">
+              <a:buAutoNum type="arabicPeriod"/>
+            </a:pPr>
+            <a:endParaRPr lang="en-US" dirty="0"/>
+          </a:p>
+          <a:p>
+            <a:pPr marL="514350" indent="-514350">
+              <a:buAutoNum type="arabicPeriod"/>
+            </a:pPr>
+            <a:endParaRPr lang="en-US" dirty="0"/>
+          </a:p>
+        </p:txBody>
+      </p:sp>
+      <p:sp>
+        <p:nvSpPr>
+          <p:cNvPr id="4" name="Title 1">
+            <a:extLst>
+              <a:ext uri="{FF2B5EF4-FFF2-40B4-BE49-F238E27FC236}">
+                <a16:creationId xmlns:a16="http://schemas.microsoft.com/office/drawing/2014/main" id="{4947E6FE-C552-B034-2EB1-41F75C4E059D}"/>
+              </a:ext>
+            </a:extLst>
+          </p:cNvPr>
+          <p:cNvSpPr txBox="1">
+            <a:spLocks/>
+          </p:cNvSpPr>
+          <p:nvPr/>
+        </p:nvSpPr>
+        <p:spPr>
+          <a:xfrm rot="5400000">
+            <a:off x="5318124" y="-5318125"/>
+            <a:ext cx="1555751" cy="12192002"/>
+          </a:xfrm>
+          <a:prstGeom prst="rect">
+            <a:avLst/>
+          </a:prstGeom>
+          <a:solidFill>
+            <a:srgbClr val="3B3B3B"/>
+          </a:solidFill>
+        </p:spPr>
+        <p:txBody>
+          <a:bodyPr vert="vert270" lIns="91440" tIns="45720" rIns="91440" bIns="45720" rtlCol="0" anchor="t" anchorCtr="0">
+            <a:normAutofit fontScale="70000" lnSpcReduction="20000"/>
+          </a:bodyPr>
+          <a:lstStyle>
+            <a:lvl1pPr algn="l" defTabSz="914400" rtl="0" eaLnBrk="1" latinLnBrk="0" hangingPunct="1">
+              <a:lnSpc>
+                <a:spcPct val="90000"/>
+              </a:lnSpc>
+              <a:spcBef>
+                <a:spcPct val="0"/>
+              </a:spcBef>
+              <a:buNone/>
+              <a:defRPr sz="4400" kern="1200">
+                <a:solidFill>
+                  <a:schemeClr val="tx1"/>
+                </a:solidFill>
+                <a:latin typeface="+mj-lt"/>
+                <a:ea typeface="+mj-ea"/>
+                <a:cs typeface="+mj-cs"/>
+              </a:defRPr>
+            </a:lvl1pPr>
+          </a:lstStyle>
+          <a:p>
+            <a:br>
+              <a:rPr lang="en-US" dirty="0"/>
+            </a:br>
+            <a:br>
+              <a:rPr lang="en-US" dirty="0"/>
+            </a:br>
+            <a:br>
+              <a:rPr lang="en-US" dirty="0"/>
+            </a:br>
+            <a:endParaRPr lang="en-US" b="1" dirty="0">
+              <a:solidFill>
+                <a:srgbClr val="FF6600"/>
+              </a:solidFill>
+            </a:endParaRPr>
+          </a:p>
+        </p:txBody>
+      </p:sp>
+      <p:sp>
+        <p:nvSpPr>
+          <p:cNvPr id="2" name="Title 1">
+            <a:extLst>
+              <a:ext uri="{FF2B5EF4-FFF2-40B4-BE49-F238E27FC236}">
+                <a16:creationId xmlns:a16="http://schemas.microsoft.com/office/drawing/2014/main" id="{174A5255-0698-8C74-EF53-06FF11F1CFC4}"/>
+              </a:ext>
+            </a:extLst>
+          </p:cNvPr>
+          <p:cNvSpPr>
+            <a:spLocks noGrp="1"/>
+          </p:cNvSpPr>
+          <p:nvPr>
+            <p:ph type="title"/>
+          </p:nvPr>
+        </p:nvSpPr>
+        <p:spPr>
+          <a:xfrm>
+            <a:off x="242777" y="152808"/>
+            <a:ext cx="10515600" cy="1325563"/>
+          </a:xfrm>
+        </p:spPr>
+        <p:txBody>
+          <a:bodyPr/>
+          <a:lstStyle/>
+          <a:p>
+            <a:r>
+              <a:rPr lang="en-US" b="1" dirty="0">
+                <a:solidFill>
+                  <a:schemeClr val="bg1"/>
+                </a:solidFill>
+              </a:rPr>
+              <a:t>Hypothesis 1</a:t>
+            </a:r>
+            <a:r>
+              <a:rPr lang="en-US" b="1" dirty="0">
                 <a:solidFill>
                   <a:srgbClr val="FF6600"/>
                 </a:solidFill>
               </a:rPr>
-              <a:t>Thank You</a:t>
-            </a:r>
-          </a:p>
-          <a:p>
-            <a:endParaRPr lang="en-US" sz="6600" dirty="0">
+              <a:t>: Different in monthly and annually profit</a:t>
+            </a:r>
+          </a:p>
+        </p:txBody>
+      </p:sp>
+      <p:sp>
+        <p:nvSpPr>
+          <p:cNvPr id="21" name="TextBox 20">
+            <a:extLst>
+              <a:ext uri="{FF2B5EF4-FFF2-40B4-BE49-F238E27FC236}">
+                <a16:creationId xmlns:a16="http://schemas.microsoft.com/office/drawing/2014/main" id="{2CDCCF61-AEAD-BD72-B08F-F591273DD0E4}"/>
+              </a:ext>
+            </a:extLst>
+          </p:cNvPr>
+          <p:cNvSpPr txBox="1"/>
+          <p:nvPr/>
+        </p:nvSpPr>
+        <p:spPr>
+          <a:xfrm>
+            <a:off x="5963929" y="2296950"/>
+            <a:ext cx="5963929" cy="1200329"/>
+          </a:xfrm>
+          <a:prstGeom prst="rect">
+            <a:avLst/>
+          </a:prstGeom>
+          <a:noFill/>
+        </p:spPr>
+        <p:txBody>
+          <a:bodyPr wrap="square" rtlCol="0">
+            <a:spAutoFit/>
+          </a:bodyPr>
+          <a:lstStyle/>
+          <a:p>
+            <a:pPr marL="285750" indent="-285750">
+              <a:buFontTx/>
+              <a:buChar char="-"/>
+            </a:pPr>
+            <a:r>
+              <a:rPr lang="en-US" dirty="0"/>
+              <a:t>Since the monthly profit of Yellow Cab outweighed Pink Cab, the yearly profit here confirmed the same thing </a:t>
+            </a:r>
+          </a:p>
+          <a:p>
+            <a:pPr marL="285750" indent="-285750">
+              <a:buFontTx/>
+              <a:buChar char="-"/>
+            </a:pPr>
+            <a:r>
+              <a:rPr lang="en-US" dirty="0"/>
+              <a:t>It seems like for both of the companies, they had the most profit in 2017 and least profit in 2018. </a:t>
+            </a:r>
+          </a:p>
+        </p:txBody>
+      </p:sp>
+      <p:pic>
+        <p:nvPicPr>
+          <p:cNvPr id="8" name="Picture 7">
+            <a:extLst>
+              <a:ext uri="{FF2B5EF4-FFF2-40B4-BE49-F238E27FC236}">
+                <a16:creationId xmlns:a16="http://schemas.microsoft.com/office/drawing/2014/main" id="{32DE6E69-13B0-1686-B33B-B53D5A7D102E}"/>
+              </a:ext>
+            </a:extLst>
+          </p:cNvPr>
+          <p:cNvPicPr>
+            <a:picLocks noChangeAspect="1"/>
+          </p:cNvPicPr>
+          <p:nvPr/>
+        </p:nvPicPr>
+        <p:blipFill>
+          <a:blip r:embed="rId2">
+            <a:extLst>
+              <a:ext uri="{28A0092B-C50C-407E-A947-70E740481C1C}">
+                <a14:useLocalDpi xmlns:a14="http://schemas.microsoft.com/office/drawing/2010/main" val="0"/>
+              </a:ext>
+            </a:extLst>
+          </a:blip>
+          <a:stretch>
+            <a:fillRect/>
+          </a:stretch>
+        </p:blipFill>
+        <p:spPr>
+          <a:xfrm>
+            <a:off x="0" y="1631179"/>
+            <a:ext cx="5963929" cy="3740921"/>
+          </a:xfrm>
+          <a:prstGeom prst="rect">
+            <a:avLst/>
+          </a:prstGeom>
+        </p:spPr>
+      </p:pic>
+    </p:spTree>
+    <p:extLst>
+      <p:ext uri="{BB962C8B-B14F-4D97-AF65-F5344CB8AC3E}">
+        <p14:creationId xmlns:p14="http://schemas.microsoft.com/office/powerpoint/2010/main" val="4192882967"/>
+      </p:ext>
+    </p:extLst>
+  </p:cSld>
+  <p:clrMapOvr>
+    <a:masterClrMapping/>
+  </p:clrMapOvr>
+</p:sld>
+</file>
+
+<file path=ppt/slides/slide8.xml><?xml version="1.0" encoding="utf-8"?>
+<p:sld xmlns:a="http://schemas.openxmlformats.org/drawingml/2006/main" xmlns:r="http://schemas.openxmlformats.org/officeDocument/2006/relationships" xmlns:p="http://schemas.openxmlformats.org/presentationml/2006/main">
+  <p:cSld>
+    <p:spTree>
+      <p:nvGrpSpPr>
+        <p:cNvPr id="1" name=""/>
+        <p:cNvGrpSpPr/>
+        <p:nvPr/>
+      </p:nvGrpSpPr>
+      <p:grpSpPr>
+        <a:xfrm>
+          <a:off x="0" y="0"/>
+          <a:ext cx="0" cy="0"/>
+          <a:chOff x="0" y="0"/>
+          <a:chExt cx="0" cy="0"/>
+        </a:xfrm>
+      </p:grpSpPr>
+      <p:sp>
+        <p:nvSpPr>
+          <p:cNvPr id="3" name="Content Placeholder 2">
+            <a:extLst>
+              <a:ext uri="{FF2B5EF4-FFF2-40B4-BE49-F238E27FC236}">
+                <a16:creationId xmlns:a16="http://schemas.microsoft.com/office/drawing/2014/main" id="{592E5A36-53E0-006E-5354-5FF7DD397199}"/>
+              </a:ext>
+            </a:extLst>
+          </p:cNvPr>
+          <p:cNvSpPr>
+            <a:spLocks noGrp="1"/>
+          </p:cNvSpPr>
+          <p:nvPr>
+            <p:ph idx="1"/>
+          </p:nvPr>
+        </p:nvSpPr>
+        <p:spPr>
+          <a:xfrm>
+            <a:off x="497958" y="1900275"/>
+            <a:ext cx="10515600" cy="4351338"/>
+          </a:xfrm>
+        </p:spPr>
+        <p:txBody>
+          <a:bodyPr/>
+          <a:lstStyle/>
+          <a:p>
+            <a:pPr marL="0" indent="0">
+              <a:buNone/>
+            </a:pPr>
+            <a:endParaRPr lang="en-US" dirty="0"/>
+          </a:p>
+          <a:p>
+            <a:pPr marL="514350" indent="-514350">
+              <a:buAutoNum type="arabicPeriod"/>
+            </a:pPr>
+            <a:endParaRPr lang="en-US" dirty="0"/>
+          </a:p>
+          <a:p>
+            <a:pPr marL="514350" indent="-514350">
+              <a:buAutoNum type="arabicPeriod"/>
+            </a:pPr>
+            <a:endParaRPr lang="en-US" dirty="0"/>
+          </a:p>
+        </p:txBody>
+      </p:sp>
+      <p:sp>
+        <p:nvSpPr>
+          <p:cNvPr id="4" name="Title 1">
+            <a:extLst>
+              <a:ext uri="{FF2B5EF4-FFF2-40B4-BE49-F238E27FC236}">
+                <a16:creationId xmlns:a16="http://schemas.microsoft.com/office/drawing/2014/main" id="{4947E6FE-C552-B034-2EB1-41F75C4E059D}"/>
+              </a:ext>
+            </a:extLst>
+          </p:cNvPr>
+          <p:cNvSpPr txBox="1">
+            <a:spLocks/>
+          </p:cNvSpPr>
+          <p:nvPr/>
+        </p:nvSpPr>
+        <p:spPr>
+          <a:xfrm rot="5400000">
+            <a:off x="5318124" y="-5318125"/>
+            <a:ext cx="1555751" cy="12192002"/>
+          </a:xfrm>
+          <a:prstGeom prst="rect">
+            <a:avLst/>
+          </a:prstGeom>
+          <a:solidFill>
+            <a:srgbClr val="3B3B3B"/>
+          </a:solidFill>
+        </p:spPr>
+        <p:txBody>
+          <a:bodyPr vert="vert270" lIns="91440" tIns="45720" rIns="91440" bIns="45720" rtlCol="0" anchor="t" anchorCtr="0">
+            <a:normAutofit fontScale="70000" lnSpcReduction="20000"/>
+          </a:bodyPr>
+          <a:lstStyle>
+            <a:lvl1pPr algn="l" defTabSz="914400" rtl="0" eaLnBrk="1" latinLnBrk="0" hangingPunct="1">
+              <a:lnSpc>
+                <a:spcPct val="90000"/>
+              </a:lnSpc>
+              <a:spcBef>
+                <a:spcPct val="0"/>
+              </a:spcBef>
+              <a:buNone/>
+              <a:defRPr sz="4400" kern="1200">
+                <a:solidFill>
+                  <a:schemeClr val="tx1"/>
+                </a:solidFill>
+                <a:latin typeface="+mj-lt"/>
+                <a:ea typeface="+mj-ea"/>
+                <a:cs typeface="+mj-cs"/>
+              </a:defRPr>
+            </a:lvl1pPr>
+          </a:lstStyle>
+          <a:p>
+            <a:br>
+              <a:rPr lang="en-US" dirty="0"/>
+            </a:br>
+            <a:br>
+              <a:rPr lang="en-US" dirty="0"/>
+            </a:br>
+            <a:br>
+              <a:rPr lang="en-US" dirty="0"/>
+            </a:br>
+            <a:endParaRPr lang="en-US" b="1" dirty="0">
               <a:solidFill>
                 <a:srgbClr val="FF6600"/>
               </a:solidFill>
@@ -4188,10 +5606,422 @@
           </a:p>
         </p:txBody>
       </p:sp>
+      <p:sp>
+        <p:nvSpPr>
+          <p:cNvPr id="2" name="Title 1">
+            <a:extLst>
+              <a:ext uri="{FF2B5EF4-FFF2-40B4-BE49-F238E27FC236}">
+                <a16:creationId xmlns:a16="http://schemas.microsoft.com/office/drawing/2014/main" id="{174A5255-0698-8C74-EF53-06FF11F1CFC4}"/>
+              </a:ext>
+            </a:extLst>
+          </p:cNvPr>
+          <p:cNvSpPr>
+            <a:spLocks noGrp="1"/>
+          </p:cNvSpPr>
+          <p:nvPr>
+            <p:ph type="title"/>
+          </p:nvPr>
+        </p:nvSpPr>
+        <p:spPr>
+          <a:xfrm>
+            <a:off x="242777" y="152808"/>
+            <a:ext cx="10515600" cy="1325563"/>
+          </a:xfrm>
+        </p:spPr>
+        <p:txBody>
+          <a:bodyPr/>
+          <a:lstStyle/>
+          <a:p>
+            <a:r>
+              <a:rPr lang="en-US" b="1" dirty="0">
+                <a:solidFill>
+                  <a:schemeClr val="bg1"/>
+                </a:solidFill>
+              </a:rPr>
+              <a:t>Hypothesis 2</a:t>
+            </a:r>
+            <a:r>
+              <a:rPr lang="en-US" b="1" dirty="0">
+                <a:solidFill>
+                  <a:srgbClr val="FF6600"/>
+                </a:solidFill>
+              </a:rPr>
+              <a:t>: Different in customers and profits in different cities </a:t>
+            </a:r>
+          </a:p>
+        </p:txBody>
+      </p:sp>
+      <p:pic>
+        <p:nvPicPr>
+          <p:cNvPr id="12" name="Picture 11">
+            <a:extLst>
+              <a:ext uri="{FF2B5EF4-FFF2-40B4-BE49-F238E27FC236}">
+                <a16:creationId xmlns:a16="http://schemas.microsoft.com/office/drawing/2014/main" id="{67DBD425-8820-E1ED-0923-5C2CA67E486B}"/>
+              </a:ext>
+            </a:extLst>
+          </p:cNvPr>
+          <p:cNvPicPr>
+            <a:picLocks noChangeAspect="1"/>
+          </p:cNvPicPr>
+          <p:nvPr/>
+        </p:nvPicPr>
+        <p:blipFill>
+          <a:blip r:embed="rId2">
+            <a:extLst>
+              <a:ext uri="{28A0092B-C50C-407E-A947-70E740481C1C}">
+                <a14:useLocalDpi xmlns:a14="http://schemas.microsoft.com/office/drawing/2010/main" val="0"/>
+              </a:ext>
+            </a:extLst>
+          </a:blip>
+          <a:stretch>
+            <a:fillRect/>
+          </a:stretch>
+        </p:blipFill>
+        <p:spPr>
+          <a:xfrm>
+            <a:off x="0" y="1662869"/>
+            <a:ext cx="11694042" cy="3387994"/>
+          </a:xfrm>
+          <a:prstGeom prst="rect">
+            <a:avLst/>
+          </a:prstGeom>
+        </p:spPr>
+      </p:pic>
+      <p:sp>
+        <p:nvSpPr>
+          <p:cNvPr id="13" name="TextBox 12">
+            <a:extLst>
+              <a:ext uri="{FF2B5EF4-FFF2-40B4-BE49-F238E27FC236}">
+                <a16:creationId xmlns:a16="http://schemas.microsoft.com/office/drawing/2014/main" id="{CDA420EF-3E74-76FF-2630-9F6E05C1A80E}"/>
+              </a:ext>
+            </a:extLst>
+          </p:cNvPr>
+          <p:cNvSpPr txBox="1"/>
+          <p:nvPr/>
+        </p:nvSpPr>
+        <p:spPr>
+          <a:xfrm>
+            <a:off x="317758" y="5050863"/>
+            <a:ext cx="11058525" cy="1754326"/>
+          </a:xfrm>
+          <a:prstGeom prst="rect">
+            <a:avLst/>
+          </a:prstGeom>
+          <a:noFill/>
+        </p:spPr>
+        <p:txBody>
+          <a:bodyPr wrap="square" rtlCol="0">
+            <a:spAutoFit/>
+          </a:bodyPr>
+          <a:lstStyle/>
+          <a:p>
+            <a:pPr marL="285750" indent="-285750">
+              <a:buFontTx/>
+              <a:buChar char="-"/>
+            </a:pPr>
+            <a:r>
+              <a:rPr lang="en-US" dirty="0"/>
+              <a:t>We can see that there are more customers using Yellow Cab than Pink Cab as they have more customers in 11 out of 19 cities in total.  Moreover, the different in amounts of customers in these cities are noticeable. </a:t>
+            </a:r>
+          </a:p>
+          <a:p>
+            <a:pPr marL="285750" indent="-285750">
+              <a:buFontTx/>
+              <a:buChar char="-"/>
+            </a:pPr>
+            <a:r>
+              <a:rPr lang="en-US" dirty="0"/>
+              <a:t>For Pink Cab, they have the most of their customers in New York (NY), and Los Angeles (CA) and least customers in Pittsburgh (PA)</a:t>
+            </a:r>
+          </a:p>
+          <a:p>
+            <a:pPr marL="285750" indent="-285750">
+              <a:buFontTx/>
+              <a:buChar char="-"/>
+            </a:pPr>
+            <a:r>
+              <a:rPr lang="en-US" dirty="0"/>
+              <a:t>For Yellow Cab, they have the most customers in New York(NY), Los Angeles (CA), Chicago (IL) and Washington DC, and least customers in Pittsburgh (PA), which even less than the Pink Cab.  </a:t>
+            </a:r>
+          </a:p>
+        </p:txBody>
+      </p:sp>
     </p:spTree>
     <p:extLst>
       <p:ext uri="{BB962C8B-B14F-4D97-AF65-F5344CB8AC3E}">
-        <p14:creationId xmlns:p14="http://schemas.microsoft.com/office/powerpoint/2010/main" val="116821060"/>
+        <p14:creationId xmlns:p14="http://schemas.microsoft.com/office/powerpoint/2010/main" val="271984748"/>
+      </p:ext>
+    </p:extLst>
+  </p:cSld>
+  <p:clrMapOvr>
+    <a:masterClrMapping/>
+  </p:clrMapOvr>
+</p:sld>
+</file>
+
+<file path=ppt/slides/slide9.xml><?xml version="1.0" encoding="utf-8"?>
+<p:sld xmlns:a="http://schemas.openxmlformats.org/drawingml/2006/main" xmlns:r="http://schemas.openxmlformats.org/officeDocument/2006/relationships" xmlns:p="http://schemas.openxmlformats.org/presentationml/2006/main">
+  <p:cSld>
+    <p:spTree>
+      <p:nvGrpSpPr>
+        <p:cNvPr id="1" name=""/>
+        <p:cNvGrpSpPr/>
+        <p:nvPr/>
+      </p:nvGrpSpPr>
+      <p:grpSpPr>
+        <a:xfrm>
+          <a:off x="0" y="0"/>
+          <a:ext cx="0" cy="0"/>
+          <a:chOff x="0" y="0"/>
+          <a:chExt cx="0" cy="0"/>
+        </a:xfrm>
+      </p:grpSpPr>
+      <p:sp>
+        <p:nvSpPr>
+          <p:cNvPr id="3" name="Content Placeholder 2">
+            <a:extLst>
+              <a:ext uri="{FF2B5EF4-FFF2-40B4-BE49-F238E27FC236}">
+                <a16:creationId xmlns:a16="http://schemas.microsoft.com/office/drawing/2014/main" id="{592E5A36-53E0-006E-5354-5FF7DD397199}"/>
+              </a:ext>
+            </a:extLst>
+          </p:cNvPr>
+          <p:cNvSpPr>
+            <a:spLocks noGrp="1"/>
+          </p:cNvSpPr>
+          <p:nvPr>
+            <p:ph idx="1"/>
+          </p:nvPr>
+        </p:nvSpPr>
+        <p:spPr>
+          <a:xfrm>
+            <a:off x="497958" y="1900275"/>
+            <a:ext cx="10515600" cy="4351338"/>
+          </a:xfrm>
+        </p:spPr>
+        <p:txBody>
+          <a:bodyPr/>
+          <a:lstStyle/>
+          <a:p>
+            <a:pPr marL="0" indent="0">
+              <a:buNone/>
+            </a:pPr>
+            <a:endParaRPr lang="en-US" dirty="0"/>
+          </a:p>
+          <a:p>
+            <a:pPr marL="514350" indent="-514350">
+              <a:buAutoNum type="arabicPeriod"/>
+            </a:pPr>
+            <a:endParaRPr lang="en-US" dirty="0"/>
+          </a:p>
+          <a:p>
+            <a:pPr marL="514350" indent="-514350">
+              <a:buAutoNum type="arabicPeriod"/>
+            </a:pPr>
+            <a:endParaRPr lang="en-US" dirty="0"/>
+          </a:p>
+        </p:txBody>
+      </p:sp>
+      <p:sp>
+        <p:nvSpPr>
+          <p:cNvPr id="4" name="Title 1">
+            <a:extLst>
+              <a:ext uri="{FF2B5EF4-FFF2-40B4-BE49-F238E27FC236}">
+                <a16:creationId xmlns:a16="http://schemas.microsoft.com/office/drawing/2014/main" id="{4947E6FE-C552-B034-2EB1-41F75C4E059D}"/>
+              </a:ext>
+            </a:extLst>
+          </p:cNvPr>
+          <p:cNvSpPr txBox="1">
+            <a:spLocks/>
+          </p:cNvSpPr>
+          <p:nvPr/>
+        </p:nvSpPr>
+        <p:spPr>
+          <a:xfrm rot="5400000">
+            <a:off x="5318124" y="-5318125"/>
+            <a:ext cx="1555751" cy="12192002"/>
+          </a:xfrm>
+          <a:prstGeom prst="rect">
+            <a:avLst/>
+          </a:prstGeom>
+          <a:solidFill>
+            <a:srgbClr val="3B3B3B"/>
+          </a:solidFill>
+        </p:spPr>
+        <p:txBody>
+          <a:bodyPr vert="vert270" lIns="91440" tIns="45720" rIns="91440" bIns="45720" rtlCol="0" anchor="t" anchorCtr="0">
+            <a:normAutofit fontScale="70000" lnSpcReduction="20000"/>
+          </a:bodyPr>
+          <a:lstStyle>
+            <a:lvl1pPr algn="l" defTabSz="914400" rtl="0" eaLnBrk="1" latinLnBrk="0" hangingPunct="1">
+              <a:lnSpc>
+                <a:spcPct val="90000"/>
+              </a:lnSpc>
+              <a:spcBef>
+                <a:spcPct val="0"/>
+              </a:spcBef>
+              <a:buNone/>
+              <a:defRPr sz="4400" kern="1200">
+                <a:solidFill>
+                  <a:schemeClr val="tx1"/>
+                </a:solidFill>
+                <a:latin typeface="+mj-lt"/>
+                <a:ea typeface="+mj-ea"/>
+                <a:cs typeface="+mj-cs"/>
+              </a:defRPr>
+            </a:lvl1pPr>
+          </a:lstStyle>
+          <a:p>
+            <a:br>
+              <a:rPr lang="en-US" dirty="0"/>
+            </a:br>
+            <a:br>
+              <a:rPr lang="en-US" dirty="0"/>
+            </a:br>
+            <a:br>
+              <a:rPr lang="en-US" dirty="0"/>
+            </a:br>
+            <a:endParaRPr lang="en-US" b="1" dirty="0">
+              <a:solidFill>
+                <a:srgbClr val="FF6600"/>
+              </a:solidFill>
+            </a:endParaRPr>
+          </a:p>
+        </p:txBody>
+      </p:sp>
+      <p:sp>
+        <p:nvSpPr>
+          <p:cNvPr id="2" name="Title 1">
+            <a:extLst>
+              <a:ext uri="{FF2B5EF4-FFF2-40B4-BE49-F238E27FC236}">
+                <a16:creationId xmlns:a16="http://schemas.microsoft.com/office/drawing/2014/main" id="{174A5255-0698-8C74-EF53-06FF11F1CFC4}"/>
+              </a:ext>
+            </a:extLst>
+          </p:cNvPr>
+          <p:cNvSpPr>
+            <a:spLocks noGrp="1"/>
+          </p:cNvSpPr>
+          <p:nvPr>
+            <p:ph type="title"/>
+          </p:nvPr>
+        </p:nvSpPr>
+        <p:spPr>
+          <a:xfrm>
+            <a:off x="242777" y="152808"/>
+            <a:ext cx="10515600" cy="1325563"/>
+          </a:xfrm>
+        </p:spPr>
+        <p:txBody>
+          <a:bodyPr/>
+          <a:lstStyle/>
+          <a:p>
+            <a:r>
+              <a:rPr lang="en-US" b="1" dirty="0">
+                <a:solidFill>
+                  <a:schemeClr val="bg1"/>
+                </a:solidFill>
+              </a:rPr>
+              <a:t>Hypothesis 2</a:t>
+            </a:r>
+            <a:r>
+              <a:rPr lang="en-US" b="1" dirty="0">
+                <a:solidFill>
+                  <a:srgbClr val="FF6600"/>
+                </a:solidFill>
+              </a:rPr>
+              <a:t>: Different in customers and profits in different cities </a:t>
+            </a:r>
+          </a:p>
+        </p:txBody>
+      </p:sp>
+      <p:pic>
+        <p:nvPicPr>
+          <p:cNvPr id="6" name="Picture 5">
+            <a:extLst>
+              <a:ext uri="{FF2B5EF4-FFF2-40B4-BE49-F238E27FC236}">
+                <a16:creationId xmlns:a16="http://schemas.microsoft.com/office/drawing/2014/main" id="{53DC243B-1C49-3E0F-8D4B-91BC0A651025}"/>
+              </a:ext>
+            </a:extLst>
+          </p:cNvPr>
+          <p:cNvPicPr>
+            <a:picLocks noChangeAspect="1"/>
+          </p:cNvPicPr>
+          <p:nvPr/>
+        </p:nvPicPr>
+        <p:blipFill>
+          <a:blip r:embed="rId2">
+            <a:extLst>
+              <a:ext uri="{28A0092B-C50C-407E-A947-70E740481C1C}">
+                <a14:useLocalDpi xmlns:a14="http://schemas.microsoft.com/office/drawing/2010/main" val="0"/>
+              </a:ext>
+            </a:extLst>
+          </a:blip>
+          <a:stretch>
+            <a:fillRect/>
+          </a:stretch>
+        </p:blipFill>
+        <p:spPr>
+          <a:xfrm>
+            <a:off x="934778" y="1478371"/>
+            <a:ext cx="10322442" cy="4404790"/>
+          </a:xfrm>
+          <a:prstGeom prst="rect">
+            <a:avLst/>
+          </a:prstGeom>
+        </p:spPr>
+      </p:pic>
+      <p:sp>
+        <p:nvSpPr>
+          <p:cNvPr id="7" name="TextBox 6">
+            <a:extLst>
+              <a:ext uri="{FF2B5EF4-FFF2-40B4-BE49-F238E27FC236}">
+                <a16:creationId xmlns:a16="http://schemas.microsoft.com/office/drawing/2014/main" id="{ABC4F4FC-93BC-AB28-F98B-4EA1D53D4081}"/>
+              </a:ext>
+            </a:extLst>
+          </p:cNvPr>
+          <p:cNvSpPr txBox="1"/>
+          <p:nvPr/>
+        </p:nvSpPr>
+        <p:spPr>
+          <a:xfrm>
+            <a:off x="342900" y="5766019"/>
+            <a:ext cx="11044238" cy="923330"/>
+          </a:xfrm>
+          <a:prstGeom prst="rect">
+            <a:avLst/>
+          </a:prstGeom>
+          <a:noFill/>
+        </p:spPr>
+        <p:txBody>
+          <a:bodyPr wrap="square" rtlCol="0">
+            <a:spAutoFit/>
+          </a:bodyPr>
+          <a:lstStyle/>
+          <a:p>
+            <a:pPr marL="285750" indent="-285750">
+              <a:buFontTx/>
+              <a:buChar char="-"/>
+            </a:pPr>
+            <a:r>
+              <a:rPr lang="en-US" dirty="0"/>
+              <a:t>Since they both have the most customers in New York (NY), they also have the most profit in this city for both companies. </a:t>
+            </a:r>
+          </a:p>
+          <a:p>
+            <a:pPr marL="285750" indent="-285750">
+              <a:buFontTx/>
+              <a:buChar char="-"/>
+            </a:pPr>
+            <a:r>
+              <a:rPr lang="en-US" dirty="0"/>
+              <a:t>In every cities, Yellow Cab always had more profit than Pink Cab</a:t>
+            </a:r>
+          </a:p>
+        </p:txBody>
+      </p:sp>
+    </p:spTree>
+    <p:extLst>
+      <p:ext uri="{BB962C8B-B14F-4D97-AF65-F5344CB8AC3E}">
+        <p14:creationId xmlns:p14="http://schemas.microsoft.com/office/powerpoint/2010/main" val="4004314323"/>
       </p:ext>
     </p:extLst>
   </p:cSld>

</xml_diff>